<commit_message>
update go share ppt
</commit_message>
<xml_diff>
--- a/Go Language Sharing.pptx
+++ b/Go Language Sharing.pptx
@@ -20,6 +20,13 @@
     <p:sldId id="268" r:id="rId15"/>
     <p:sldId id="269" r:id="rId16"/>
     <p:sldId id="270" r:id="rId17"/>
+    <p:sldId id="271" r:id="rId18"/>
+    <p:sldId id="272" r:id="rId19"/>
+    <p:sldId id="273" r:id="rId20"/>
+    <p:sldId id="274" r:id="rId21"/>
+    <p:sldId id="275" r:id="rId22"/>
+    <p:sldId id="276" r:id="rId23"/>
+    <p:sldId id="277" r:id="rId24"/>
   </p:sldIdLst>
   <p:sldSz cx="12192000" cy="6858000"/>
   <p:notesSz cx="6858000" cy="9144000"/>
@@ -3777,36 +3784,576 @@
       <p:grpSpPr/>
       <p:sp>
         <p:nvSpPr>
-          <p:cNvPr id="2" name="标题 1"/>
-          <p:cNvSpPr>
-            <a:spLocks noGrp="1"/>
-          </p:cNvSpPr>
-          <p:nvPr>
-            <p:ph type="title"/>
-          </p:nvPr>
-        </p:nvSpPr>
-        <p:spPr/>
-        <p:txBody>
-          <a:bodyPr/>
-          <a:p>
-            <a:endParaRPr lang="zh-CN" altLang="en-US"/>
-          </a:p>
-        </p:txBody>
-      </p:sp>
-      <p:sp>
-        <p:nvSpPr>
-          <p:cNvPr id="3" name="内容占位符 2"/>
-          <p:cNvSpPr>
-            <a:spLocks noGrp="1"/>
-          </p:cNvSpPr>
-          <p:nvPr>
-            <p:ph idx="1"/>
-          </p:nvPr>
-        </p:nvSpPr>
-        <p:spPr/>
-        <p:txBody>
-          <a:bodyPr/>
-          <a:p>
+          <p:cNvPr id="4" name="文本框 3"/>
+          <p:cNvSpPr txBox="1"/>
+          <p:nvPr/>
+        </p:nvSpPr>
+        <p:spPr>
+          <a:xfrm>
+            <a:off x="1634490" y="1073785"/>
+            <a:ext cx="6541770" cy="4206240"/>
+          </a:xfrm>
+          <a:prstGeom prst="rect">
+            <a:avLst/>
+          </a:prstGeom>
+          <a:noFill/>
+        </p:spPr>
+        <p:txBody>
+          <a:bodyPr wrap="square" rtlCol="0" anchor="t">
+            <a:spAutoFit/>
+          </a:bodyPr>
+          <a:p>
+            <a:r>
+              <a:rPr lang="zh-CN" altLang="en-US"/>
+              <a:t>    interface satisfaction</a:t>
+            </a:r>
+            <a:endParaRPr lang="zh-CN" altLang="en-US"/>
+          </a:p>
+          <a:p>
+            <a:r>
+              <a:rPr lang="zh-CN" altLang="en-US"/>
+              <a:t>        A type statisfies an interface if it possesses all the methods the interface requires.</a:t>
+            </a:r>
+            <a:endParaRPr lang="zh-CN" altLang="en-US"/>
+          </a:p>
+          <a:p>
+            <a:endParaRPr lang="zh-CN" altLang="en-US"/>
+          </a:p>
+          <a:p>
+            <a:r>
+              <a:rPr lang="zh-CN" altLang="en-US"/>
+              <a:t>        var w io.Writer</a:t>
+            </a:r>
+            <a:endParaRPr lang="zh-CN" altLang="en-US"/>
+          </a:p>
+          <a:p>
+            <a:r>
+              <a:rPr lang="zh-CN" altLang="en-US"/>
+              <a:t>        w = os.Stdout              // ok</a:t>
+            </a:r>
+            <a:endParaRPr lang="zh-CN" altLang="en-US"/>
+          </a:p>
+          <a:p>
+            <a:r>
+              <a:rPr lang="zh-CN" altLang="en-US"/>
+              <a:t>        w = new(bytes.Buffer)      // ok</a:t>
+            </a:r>
+            <a:endParaRPr lang="zh-CN" altLang="en-US"/>
+          </a:p>
+          <a:p>
+            <a:r>
+              <a:rPr lang="zh-CN" altLang="en-US"/>
+              <a:t>        w = time.Second            // compile error</a:t>
+            </a:r>
+            <a:endParaRPr lang="zh-CN" altLang="en-US"/>
+          </a:p>
+          <a:p>
+            <a:endParaRPr lang="zh-CN" altLang="en-US"/>
+          </a:p>
+          <a:p>
+            <a:r>
+              <a:rPr lang="zh-CN" altLang="en-US"/>
+              <a:t>        var any interface{}</a:t>
+            </a:r>
+            <a:endParaRPr lang="zh-CN" altLang="en-US"/>
+          </a:p>
+          <a:p>
+            <a:r>
+              <a:rPr lang="zh-CN" altLang="en-US"/>
+              <a:t>        any = true</a:t>
+            </a:r>
+            <a:endParaRPr lang="zh-CN" altLang="en-US"/>
+          </a:p>
+          <a:p>
+            <a:r>
+              <a:rPr lang="zh-CN" altLang="en-US"/>
+              <a:t>        any = 12.24</a:t>
+            </a:r>
+            <a:endParaRPr lang="zh-CN" altLang="en-US"/>
+          </a:p>
+          <a:p>
+            <a:r>
+              <a:rPr lang="zh-CN" altLang="en-US"/>
+              <a:t>        any = "hello"</a:t>
+            </a:r>
+            <a:endParaRPr lang="zh-CN" altLang="en-US"/>
+          </a:p>
+          <a:p>
+            <a:r>
+              <a:rPr lang="zh-CN" altLang="en-US"/>
+              <a:t>        any = new(bytes.Buffer)</a:t>
+            </a:r>
+            <a:endParaRPr lang="zh-CN" altLang="en-US"/>
+          </a:p>
+          <a:p>
+            <a:r>
+              <a:rPr lang="zh-CN" altLang="en-US"/>
+              <a:t>        any = time.Second</a:t>
+            </a:r>
+            <a:endParaRPr lang="zh-CN" altLang="en-US"/>
+          </a:p>
+        </p:txBody>
+      </p:sp>
+    </p:spTree>
+  </p:cSld>
+  <p:clrMapOvr>
+    <a:masterClrMapping/>
+  </p:clrMapOvr>
+</p:sld>
+</file>
+
+<file path=ppt/slides/slide16.xml><?xml version="1.0" encoding="utf-8"?>
+<p:sld xmlns:a="http://schemas.openxmlformats.org/drawingml/2006/main" xmlns:r="http://schemas.openxmlformats.org/officeDocument/2006/relationships" xmlns:p="http://schemas.openxmlformats.org/presentationml/2006/main">
+  <p:cSld>
+    <p:spTree>
+      <p:nvGrpSpPr>
+        <p:cNvPr id="1" name=""/>
+        <p:cNvGrpSpPr/>
+        <p:nvPr/>
+      </p:nvGrpSpPr>
+      <p:grpSpPr/>
+      <p:sp>
+        <p:nvSpPr>
+          <p:cNvPr id="4" name="文本框 3"/>
+          <p:cNvSpPr txBox="1"/>
+          <p:nvPr/>
+        </p:nvSpPr>
+        <p:spPr>
+          <a:xfrm>
+            <a:off x="509905" y="311785"/>
+            <a:ext cx="10427335" cy="6126480"/>
+          </a:xfrm>
+          <a:prstGeom prst="rect">
+            <a:avLst/>
+          </a:prstGeom>
+          <a:noFill/>
+        </p:spPr>
+        <p:txBody>
+          <a:bodyPr wrap="square" rtlCol="0" anchor="t">
+            <a:spAutoFit/>
+          </a:bodyPr>
+          <a:p>
+            <a:r>
+              <a:rPr lang="zh-CN" altLang="en-US"/>
+              <a:t>    interface value</a:t>
+            </a:r>
+            <a:endParaRPr lang="zh-CN" altLang="en-US"/>
+          </a:p>
+          <a:p>
+            <a:r>
+              <a:rPr lang="zh-CN" altLang="en-US"/>
+              <a:t>        A value of an interface type has two components, a concrete type and a value of that type.</a:t>
+            </a:r>
+            <a:endParaRPr lang="zh-CN" altLang="en-US"/>
+          </a:p>
+          <a:p>
+            <a:r>
+              <a:rPr lang="zh-CN" altLang="en-US"/>
+              <a:t>        var w io.Writer</a:t>
+            </a:r>
+            <a:endParaRPr lang="zh-CN" altLang="en-US"/>
+          </a:p>
+          <a:p>
+            <a:r>
+              <a:rPr lang="zh-CN" altLang="en-US"/>
+              <a:t>        w = os.Stdout</a:t>
+            </a:r>
+            <a:endParaRPr lang="zh-CN" altLang="en-US"/>
+          </a:p>
+          <a:p>
+            <a:r>
+              <a:rPr lang="zh-CN" altLang="en-US"/>
+              <a:t>        w = new(bytes.Buffer)</a:t>
+            </a:r>
+            <a:endParaRPr lang="zh-CN" altLang="en-US"/>
+          </a:p>
+          <a:p>
+            <a:r>
+              <a:rPr lang="zh-CN" altLang="en-US"/>
+              <a:t>        w = nil</a:t>
+            </a:r>
+            <a:endParaRPr lang="zh-CN" altLang="en-US"/>
+          </a:p>
+          <a:p>
+            <a:endParaRPr lang="zh-CN" altLang="en-US"/>
+          </a:p>
+          <a:p>
+            <a:r>
+              <a:rPr lang="zh-CN" altLang="en-US"/>
+              <a:t>    type assertions</a:t>
+            </a:r>
+            <a:endParaRPr lang="zh-CN" altLang="en-US"/>
+          </a:p>
+          <a:p>
+            <a:r>
+              <a:rPr lang="zh-CN" altLang="en-US"/>
+              <a:t>        A type assertion is an operation applied to an interface value.</a:t>
+            </a:r>
+            <a:endParaRPr lang="zh-CN" altLang="en-US"/>
+          </a:p>
+          <a:p>
+            <a:r>
+              <a:rPr lang="zh-CN" altLang="en-US"/>
+              <a:t>        </a:t>
+            </a:r>
+            <a:endParaRPr lang="zh-CN" altLang="en-US"/>
+          </a:p>
+          <a:p>
+            <a:r>
+              <a:rPr lang="zh-CN" altLang="en-US"/>
+              <a:t>        x.(T)</a:t>
+            </a:r>
+            <a:endParaRPr lang="zh-CN" altLang="en-US"/>
+          </a:p>
+          <a:p>
+            <a:r>
+              <a:rPr lang="zh-CN" altLang="en-US"/>
+              <a:t>    </a:t>
+            </a:r>
+            <a:endParaRPr lang="zh-CN" altLang="en-US"/>
+          </a:p>
+          <a:p>
+            <a:r>
+              <a:rPr lang="zh-CN" altLang="en-US"/>
+              <a:t>    type switchs</a:t>
+            </a:r>
+            <a:endParaRPr lang="zh-CN" altLang="en-US"/>
+          </a:p>
+          <a:p>
+            <a:r>
+              <a:rPr lang="zh-CN" altLang="en-US"/>
+              <a:t>    </a:t>
+            </a:r>
+            <a:endParaRPr lang="zh-CN" altLang="en-US"/>
+          </a:p>
+          <a:p>
+            <a:r>
+              <a:rPr lang="zh-CN" altLang="en-US"/>
+              <a:t>        switch x.(type) {</a:t>
+            </a:r>
+            <a:endParaRPr lang="zh-CN" altLang="en-US"/>
+          </a:p>
+          <a:p>
+            <a:r>
+              <a:rPr lang="zh-CN" altLang="en-US"/>
+              <a:t>        case nil:</a:t>
+            </a:r>
+            <a:endParaRPr lang="zh-CN" altLang="en-US"/>
+          </a:p>
+          <a:p>
+            <a:r>
+              <a:rPr lang="zh-CN" altLang="en-US"/>
+              <a:t>        case int, unint:</a:t>
+            </a:r>
+            <a:endParaRPr lang="zh-CN" altLang="en-US"/>
+          </a:p>
+          <a:p>
+            <a:r>
+              <a:rPr lang="zh-CN" altLang="en-US"/>
+              <a:t>        case bool:</a:t>
+            </a:r>
+            <a:endParaRPr lang="zh-CN" altLang="en-US"/>
+          </a:p>
+          <a:p>
+            <a:r>
+              <a:rPr lang="zh-CN" altLang="en-US"/>
+              <a:t>        case string:</a:t>
+            </a:r>
+            <a:endParaRPr lang="zh-CN" altLang="en-US"/>
+          </a:p>
+          <a:p>
+            <a:r>
+              <a:rPr lang="zh-CN" altLang="en-US"/>
+              <a:t>        default:</a:t>
+            </a:r>
+            <a:endParaRPr lang="zh-CN" altLang="en-US"/>
+          </a:p>
+          <a:p>
+            <a:r>
+              <a:rPr lang="zh-CN" altLang="en-US"/>
+              <a:t>        }</a:t>
+            </a:r>
+            <a:endParaRPr lang="zh-CN" altLang="en-US"/>
+          </a:p>
+        </p:txBody>
+      </p:sp>
+    </p:spTree>
+  </p:cSld>
+  <p:clrMapOvr>
+    <a:masterClrMapping/>
+  </p:clrMapOvr>
+</p:sld>
+</file>
+
+<file path=ppt/slides/slide17.xml><?xml version="1.0" encoding="utf-8"?>
+<p:sld xmlns:a="http://schemas.openxmlformats.org/drawingml/2006/main" xmlns:r="http://schemas.openxmlformats.org/officeDocument/2006/relationships" xmlns:p="http://schemas.openxmlformats.org/presentationml/2006/main">
+  <p:cSld>
+    <p:spTree>
+      <p:nvGrpSpPr>
+        <p:cNvPr id="1" name=""/>
+        <p:cNvGrpSpPr/>
+        <p:nvPr/>
+      </p:nvGrpSpPr>
+      <p:grpSpPr/>
+      <p:sp>
+        <p:nvSpPr>
+          <p:cNvPr id="4" name="文本框 3"/>
+          <p:cNvSpPr txBox="1"/>
+          <p:nvPr/>
+        </p:nvSpPr>
+        <p:spPr>
+          <a:xfrm>
+            <a:off x="143510" y="1414145"/>
+            <a:ext cx="11838305" cy="1737360"/>
+          </a:xfrm>
+          <a:prstGeom prst="rect">
+            <a:avLst/>
+          </a:prstGeom>
+          <a:noFill/>
+        </p:spPr>
+        <p:txBody>
+          <a:bodyPr wrap="square" rtlCol="0" anchor="t">
+            <a:spAutoFit/>
+          </a:bodyPr>
+          <a:p>
+            <a:r>
+              <a:rPr lang="zh-CN" altLang="en-US"/>
+              <a:t>Two stlyes of concurrent programming</a:t>
+            </a:r>
+            <a:endParaRPr lang="zh-CN" altLang="en-US"/>
+          </a:p>
+          <a:p>
+            <a:r>
+              <a:rPr lang="zh-CN" altLang="en-US"/>
+              <a:t>    CSP(communicating sequential process), a model of concurrency in which values are passed between independent activities(goroutines) but variables are for the most part confined to a single activity.</a:t>
+            </a:r>
+            <a:endParaRPr lang="zh-CN" altLang="en-US"/>
+          </a:p>
+          <a:p>
+            <a:r>
+              <a:rPr lang="zh-CN" altLang="en-US"/>
+              <a:t>    Mutual Exclusion, a approach is to allow many goroutines to access the variable, but only one at a time.</a:t>
+            </a:r>
+            <a:endParaRPr lang="zh-CN" altLang="en-US"/>
+          </a:p>
+        </p:txBody>
+      </p:sp>
+    </p:spTree>
+  </p:cSld>
+  <p:clrMapOvr>
+    <a:masterClrMapping/>
+  </p:clrMapOvr>
+</p:sld>
+</file>
+
+<file path=ppt/slides/slide18.xml><?xml version="1.0" encoding="utf-8"?>
+<p:sld xmlns:a="http://schemas.openxmlformats.org/drawingml/2006/main" xmlns:r="http://schemas.openxmlformats.org/officeDocument/2006/relationships" xmlns:p="http://schemas.openxmlformats.org/presentationml/2006/main">
+  <p:cSld>
+    <p:spTree>
+      <p:nvGrpSpPr>
+        <p:cNvPr id="1" name=""/>
+        <p:cNvGrpSpPr/>
+        <p:nvPr/>
+      </p:nvGrpSpPr>
+      <p:grpSpPr/>
+      <p:sp>
+        <p:nvSpPr>
+          <p:cNvPr id="4" name="文本框 3"/>
+          <p:cNvSpPr txBox="1"/>
+          <p:nvPr/>
+        </p:nvSpPr>
+        <p:spPr>
+          <a:xfrm>
+            <a:off x="508635" y="1051560"/>
+            <a:ext cx="10781030" cy="2286000"/>
+          </a:xfrm>
+          <a:prstGeom prst="rect">
+            <a:avLst/>
+          </a:prstGeom>
+          <a:noFill/>
+        </p:spPr>
+        <p:txBody>
+          <a:bodyPr wrap="square" rtlCol="0" anchor="t">
+            <a:spAutoFit/>
+          </a:bodyPr>
+          <a:p>
+            <a:r>
+              <a:rPr lang="zh-CN" altLang="en-US"/>
+              <a:t>Goroutines</a:t>
+            </a:r>
+            <a:endParaRPr lang="zh-CN" altLang="en-US"/>
+          </a:p>
+          <a:p>
+            <a:r>
+              <a:rPr lang="zh-CN" altLang="en-US"/>
+              <a:t>    Each concurrently executing activity is called a goroutine.</a:t>
+            </a:r>
+            <a:endParaRPr lang="zh-CN" altLang="en-US"/>
+          </a:p>
+          <a:p>
+            <a:r>
+              <a:rPr lang="zh-CN" altLang="en-US"/>
+              <a:t>        now can assume a goroutine is similar to a thread.</a:t>
+            </a:r>
+            <a:endParaRPr lang="zh-CN" altLang="en-US"/>
+          </a:p>
+          <a:p>
+            <a:r>
+              <a:rPr lang="zh-CN" altLang="en-US"/>
+              <a:t>        main goroutine</a:t>
+            </a:r>
+            <a:endParaRPr lang="zh-CN" altLang="en-US"/>
+          </a:p>
+          <a:p>
+            <a:r>
+              <a:rPr lang="zh-CN" altLang="en-US"/>
+              <a:t>        created by the go statement</a:t>
+            </a:r>
+            <a:endParaRPr lang="zh-CN" altLang="en-US"/>
+          </a:p>
+          <a:p>
+            <a:r>
+              <a:rPr lang="zh-CN" altLang="en-US"/>
+              <a:t>    </a:t>
+            </a:r>
+            <a:endParaRPr lang="zh-CN" altLang="en-US"/>
+          </a:p>
+          <a:p>
+            <a:r>
+              <a:rPr lang="zh-CN" altLang="en-US"/>
+              <a:t>    f() // call f(); wait for is to return</a:t>
+            </a:r>
+            <a:endParaRPr lang="zh-CN" altLang="en-US"/>
+          </a:p>
+          <a:p>
+            <a:r>
+              <a:rPr lang="zh-CN" altLang="en-US"/>
+              <a:t>    go f() // create a new goroutine that calls f(); don't wait</a:t>
+            </a:r>
+            <a:endParaRPr lang="zh-CN" altLang="en-US"/>
+          </a:p>
+        </p:txBody>
+      </p:sp>
+    </p:spTree>
+  </p:cSld>
+  <p:clrMapOvr>
+    <a:masterClrMapping/>
+  </p:clrMapOvr>
+</p:sld>
+</file>
+
+<file path=ppt/slides/slide19.xml><?xml version="1.0" encoding="utf-8"?>
+<p:sld xmlns:a="http://schemas.openxmlformats.org/drawingml/2006/main" xmlns:r="http://schemas.openxmlformats.org/officeDocument/2006/relationships" xmlns:p="http://schemas.openxmlformats.org/presentationml/2006/main">
+  <p:cSld>
+    <p:spTree>
+      <p:nvGrpSpPr>
+        <p:cNvPr id="1" name=""/>
+        <p:cNvGrpSpPr/>
+        <p:nvPr/>
+      </p:nvGrpSpPr>
+      <p:grpSpPr/>
+      <p:sp>
+        <p:nvSpPr>
+          <p:cNvPr id="4" name="文本框 3"/>
+          <p:cNvSpPr txBox="1"/>
+          <p:nvPr/>
+        </p:nvSpPr>
+        <p:spPr>
+          <a:xfrm>
+            <a:off x="424180" y="319405"/>
+            <a:ext cx="11162665" cy="5029200"/>
+          </a:xfrm>
+          <a:prstGeom prst="rect">
+            <a:avLst/>
+          </a:prstGeom>
+          <a:noFill/>
+        </p:spPr>
+        <p:txBody>
+          <a:bodyPr wrap="square" rtlCol="0" anchor="t">
+            <a:spAutoFit/>
+          </a:bodyPr>
+          <a:p>
+            <a:r>
+              <a:rPr lang="zh-CN" altLang="en-US"/>
+              <a:t>    distinguish threads</a:t>
+            </a:r>
+            <a:endParaRPr lang="zh-CN" altLang="en-US"/>
+          </a:p>
+          <a:p>
+            <a:r>
+              <a:rPr lang="zh-CN" altLang="en-US"/>
+              <a:t>        stack</a:t>
+            </a:r>
+            <a:endParaRPr lang="zh-CN" altLang="en-US"/>
+          </a:p>
+          <a:p>
+            <a:r>
+              <a:rPr lang="zh-CN" altLang="en-US"/>
+              <a:t>            It's a work area where is saves the local variables of function calls that are in progress or temporarily suspended while another function is called.</a:t>
+            </a:r>
+            <a:endParaRPr lang="zh-CN" altLang="en-US"/>
+          </a:p>
+          <a:p>
+            <a:r>
+              <a:rPr lang="zh-CN" altLang="en-US"/>
+              <a:t>        growable stacks</a:t>
+            </a:r>
+            <a:endParaRPr lang="zh-CN" altLang="en-US"/>
+          </a:p>
+          <a:p>
+            <a:r>
+              <a:rPr lang="zh-CN" altLang="en-US"/>
+              <a:t>            OS thread has a fixed-size block of memory(often as large as 2MB) for its stack.</a:t>
+            </a:r>
+            <a:endParaRPr lang="zh-CN" altLang="en-US"/>
+          </a:p>
+          <a:p>
+            <a:r>
+              <a:rPr lang="zh-CN" altLang="en-US"/>
+              <a:t>            A goroutine starts life with a small stack, typically 2KB. Its not fixed, it grows and shrinks as needed.</a:t>
+            </a:r>
+            <a:endParaRPr lang="zh-CN" altLang="en-US"/>
+          </a:p>
+          <a:p>
+            <a:r>
+              <a:rPr lang="zh-CN" altLang="en-US"/>
+              <a:t>        goroutine scheduling</a:t>
+            </a:r>
+            <a:endParaRPr lang="zh-CN" altLang="en-US"/>
+          </a:p>
+          <a:p>
+            <a:r>
+              <a:rPr lang="zh-CN" altLang="en-US"/>
+              <a:t>            OS threads are scheduled by the OS kernel. Every few milliseconds, a hardware timer interrupts the processor, which causes a kernel function called the scheduler to be invoked.</a:t>
+            </a:r>
+            <a:endParaRPr lang="zh-CN" altLang="en-US"/>
+          </a:p>
+          <a:p>
+            <a:r>
+              <a:rPr lang="zh-CN" altLang="en-US"/>
+              <a:t>                a full context switch</a:t>
+            </a:r>
+            <a:endParaRPr lang="zh-CN" altLang="en-US"/>
+          </a:p>
+          <a:p>
+            <a:r>
+              <a:rPr lang="zh-CN" altLang="en-US"/>
+              <a:t>            The Go runtime contains its own scheduler that known as m:n scheduling (it multiplexes m goroutines on n OS threads, is analogous to the kernel scheduler).</a:t>
+            </a:r>
+            <a:endParaRPr lang="zh-CN" altLang="en-US"/>
+          </a:p>
+          <a:p>
+            <a:r>
+              <a:rPr lang="zh-CN" altLang="en-US"/>
+              <a:t>                the Go scheduler is not invoked periodically by a hardware timer, but implicitly by certain Go language constructs.</a:t>
+            </a:r>
+            <a:endParaRPr lang="zh-CN" altLang="en-US"/>
+          </a:p>
+          <a:p>
+            <a:r>
+              <a:rPr lang="zh-CN" altLang="en-US"/>
+              <a:t>                GOMAXPROCS is the n in m:n scheduling. It's default value is the number of CPUs on the machine. </a:t>
+            </a:r>
             <a:endParaRPr lang="zh-CN" altLang="en-US"/>
           </a:p>
         </p:txBody>
@@ -3931,6 +4478,372 @@
             <a:r>
               <a:rPr lang="zh-CN" altLang="en-US"/>
               <a:t>Go 1.7 was released in this year.</a:t>
+            </a:r>
+            <a:endParaRPr lang="zh-CN" altLang="en-US"/>
+          </a:p>
+        </p:txBody>
+      </p:sp>
+    </p:spTree>
+  </p:cSld>
+  <p:clrMapOvr>
+    <a:masterClrMapping/>
+  </p:clrMapOvr>
+</p:sld>
+</file>
+
+<file path=ppt/slides/slide20.xml><?xml version="1.0" encoding="utf-8"?>
+<p:sld xmlns:a="http://schemas.openxmlformats.org/drawingml/2006/main" xmlns:r="http://schemas.openxmlformats.org/officeDocument/2006/relationships" xmlns:p="http://schemas.openxmlformats.org/presentationml/2006/main">
+  <p:cSld>
+    <p:spTree>
+      <p:nvGrpSpPr>
+        <p:cNvPr id="1" name=""/>
+        <p:cNvGrpSpPr/>
+        <p:nvPr/>
+      </p:nvGrpSpPr>
+      <p:grpSpPr/>
+      <p:sp>
+        <p:nvSpPr>
+          <p:cNvPr id="6" name="文本框 5"/>
+          <p:cNvSpPr txBox="1"/>
+          <p:nvPr/>
+        </p:nvSpPr>
+        <p:spPr>
+          <a:xfrm>
+            <a:off x="876300" y="1860550"/>
+            <a:ext cx="11089640" cy="2560320"/>
+          </a:xfrm>
+          <a:prstGeom prst="rect">
+            <a:avLst/>
+          </a:prstGeom>
+          <a:noFill/>
+        </p:spPr>
+        <p:txBody>
+          <a:bodyPr wrap="square" rtlCol="0" anchor="t">
+            <a:spAutoFit/>
+          </a:bodyPr>
+          <a:p>
+            <a:r>
+              <a:rPr lang="zh-CN" altLang="en-US"/>
+              <a:t>Channels</a:t>
+            </a:r>
+            <a:endParaRPr lang="zh-CN" altLang="en-US"/>
+          </a:p>
+          <a:p>
+            <a:r>
+              <a:rPr lang="zh-CN" altLang="en-US"/>
+              <a:t>    A channel is a communication mechanism that lets one goroutine send values to another goroutine.</a:t>
+            </a:r>
+            <a:endParaRPr lang="zh-CN" altLang="en-US"/>
+          </a:p>
+          <a:p>
+            <a:r>
+              <a:rPr lang="zh-CN" altLang="en-US"/>
+              <a:t>    Each channel is a conduit for values of a particular type, called the channel's element type.</a:t>
+            </a:r>
+            <a:endParaRPr lang="zh-CN" altLang="en-US"/>
+          </a:p>
+          <a:p>
+            <a:r>
+              <a:rPr lang="zh-CN" altLang="en-US"/>
+              <a:t>    The type of a channle whose elements have type int is written chan int.</a:t>
+            </a:r>
+            <a:endParaRPr lang="zh-CN" altLang="en-US"/>
+          </a:p>
+          <a:p>
+            <a:endParaRPr lang="zh-CN" altLang="en-US"/>
+          </a:p>
+          <a:p>
+            <a:r>
+              <a:rPr lang="zh-CN" altLang="en-US"/>
+              <a:t>    create a channel</a:t>
+            </a:r>
+            <a:endParaRPr lang="zh-CN" altLang="en-US"/>
+          </a:p>
+          <a:p>
+            <a:r>
+              <a:rPr lang="zh-CN" altLang="en-US"/>
+              <a:t>        ch := make(chan int) // ch has type 'chan int', unbuffered channel</a:t>
+            </a:r>
+            <a:endParaRPr lang="zh-CN" altLang="en-US"/>
+          </a:p>
+          <a:p>
+            <a:r>
+              <a:rPr lang="zh-CN" altLang="en-US"/>
+              <a:t>        ch := make(chan int, 3) // ch has type 'chan int' , buffered channel with capacity 3</a:t>
+            </a:r>
+            <a:endParaRPr lang="zh-CN" altLang="en-US"/>
+          </a:p>
+        </p:txBody>
+      </p:sp>
+    </p:spTree>
+  </p:cSld>
+  <p:clrMapOvr>
+    <a:masterClrMapping/>
+  </p:clrMapOvr>
+</p:sld>
+</file>
+
+<file path=ppt/slides/slide21.xml><?xml version="1.0" encoding="utf-8"?>
+<p:sld xmlns:a="http://schemas.openxmlformats.org/drawingml/2006/main" xmlns:r="http://schemas.openxmlformats.org/officeDocument/2006/relationships" xmlns:p="http://schemas.openxmlformats.org/presentationml/2006/main">
+  <p:cSld>
+    <p:spTree>
+      <p:nvGrpSpPr>
+        <p:cNvPr id="1" name=""/>
+        <p:cNvGrpSpPr/>
+        <p:nvPr/>
+      </p:nvGrpSpPr>
+      <p:grpSpPr/>
+      <p:sp>
+        <p:nvSpPr>
+          <p:cNvPr id="5" name="文本框 4"/>
+          <p:cNvSpPr txBox="1"/>
+          <p:nvPr/>
+        </p:nvSpPr>
+        <p:spPr>
+          <a:xfrm>
+            <a:off x="1073785" y="1416685"/>
+            <a:ext cx="10116185" cy="4206240"/>
+          </a:xfrm>
+          <a:prstGeom prst="rect">
+            <a:avLst/>
+          </a:prstGeom>
+          <a:noFill/>
+        </p:spPr>
+        <p:txBody>
+          <a:bodyPr wrap="square" rtlCol="0" anchor="t">
+            <a:spAutoFit/>
+          </a:bodyPr>
+          <a:p>
+            <a:r>
+              <a:rPr lang="zh-CN" altLang="en-US"/>
+              <a:t>    operations</a:t>
+            </a:r>
+            <a:endParaRPr lang="zh-CN" altLang="en-US"/>
+          </a:p>
+          <a:p>
+            <a:r>
+              <a:rPr lang="zh-CN" altLang="en-US"/>
+              <a:t>        send and receive</a:t>
+            </a:r>
+            <a:endParaRPr lang="zh-CN" altLang="en-US"/>
+          </a:p>
+          <a:p>
+            <a:r>
+              <a:rPr lang="zh-CN" altLang="en-US"/>
+              <a:t>        </a:t>
+            </a:r>
+            <a:endParaRPr lang="zh-CN" altLang="en-US"/>
+          </a:p>
+          <a:p>
+            <a:r>
+              <a:rPr lang="zh-CN" altLang="en-US"/>
+              <a:t>            ch &lt;- x  // a send statement</a:t>
+            </a:r>
+            <a:endParaRPr lang="zh-CN" altLang="en-US"/>
+          </a:p>
+          <a:p>
+            <a:r>
+              <a:rPr lang="zh-CN" altLang="en-US"/>
+              <a:t>            x = &lt;-ch // a receive expression in an assignment statement</a:t>
+            </a:r>
+            <a:endParaRPr lang="zh-CN" altLang="en-US"/>
+          </a:p>
+          <a:p>
+            <a:r>
+              <a:rPr lang="zh-CN" altLang="en-US"/>
+              <a:t>            &lt;-ch</a:t>
+            </a:r>
+            <a:endParaRPr lang="zh-CN" altLang="en-US"/>
+          </a:p>
+          <a:p>
+            <a:endParaRPr lang="zh-CN" altLang="en-US"/>
+          </a:p>
+          <a:p>
+            <a:r>
+              <a:rPr lang="zh-CN" altLang="en-US"/>
+              <a:t>        close</a:t>
+            </a:r>
+            <a:endParaRPr lang="zh-CN" altLang="en-US"/>
+          </a:p>
+          <a:p>
+            <a:endParaRPr lang="zh-CN" altLang="en-US"/>
+          </a:p>
+          <a:p>
+            <a:r>
+              <a:rPr lang="zh-CN" altLang="en-US"/>
+              <a:t>            close(ch)</a:t>
+            </a:r>
+            <a:endParaRPr lang="zh-CN" altLang="en-US"/>
+          </a:p>
+          <a:p>
+            <a:endParaRPr lang="zh-CN" altLang="en-US"/>
+          </a:p>
+          <a:p>
+            <a:r>
+              <a:rPr lang="zh-CN" altLang="en-US"/>
+              <a:t>    A send operation on an unbuffered channel blocks the sending goroutine until another goroutine executes a corresponding receive on the same channel, at which point the value is transmitted and both goroutines may continue.</a:t>
+            </a:r>
+            <a:endParaRPr lang="zh-CN" altLang="en-US"/>
+          </a:p>
+          <a:p>
+            <a:r>
+              <a:rPr lang="zh-CN" altLang="en-US"/>
+              <a:t>        communication causes synchronize</a:t>
+            </a:r>
+            <a:endParaRPr lang="zh-CN" altLang="en-US"/>
+          </a:p>
+        </p:txBody>
+      </p:sp>
+    </p:spTree>
+  </p:cSld>
+  <p:clrMapOvr>
+    <a:masterClrMapping/>
+  </p:clrMapOvr>
+</p:sld>
+</file>
+
+<file path=ppt/slides/slide22.xml><?xml version="1.0" encoding="utf-8"?>
+<p:sld xmlns:a="http://schemas.openxmlformats.org/drawingml/2006/main" xmlns:r="http://schemas.openxmlformats.org/officeDocument/2006/relationships" xmlns:p="http://schemas.openxmlformats.org/presentationml/2006/main">
+  <p:cSld>
+    <p:spTree>
+      <p:nvGrpSpPr>
+        <p:cNvPr id="1" name=""/>
+        <p:cNvGrpSpPr/>
+        <p:nvPr/>
+      </p:nvGrpSpPr>
+      <p:grpSpPr/>
+      <p:sp>
+        <p:nvSpPr>
+          <p:cNvPr id="4" name="文本框 3"/>
+          <p:cNvSpPr txBox="1"/>
+          <p:nvPr/>
+        </p:nvSpPr>
+        <p:spPr>
+          <a:xfrm>
+            <a:off x="889635" y="833755"/>
+            <a:ext cx="10173970" cy="5303520"/>
+          </a:xfrm>
+          <a:prstGeom prst="rect">
+            <a:avLst/>
+          </a:prstGeom>
+          <a:noFill/>
+        </p:spPr>
+        <p:txBody>
+          <a:bodyPr wrap="square" rtlCol="0" anchor="t">
+            <a:spAutoFit/>
+          </a:bodyPr>
+          <a:p>
+            <a:r>
+              <a:rPr lang="zh-CN" altLang="en-US"/>
+              <a:t>    A buffered channel has a queue of elements, a send operation on a buffered channel inserts an element at the back of the queue, and a receive operation removes an element from the front.</a:t>
+            </a:r>
+            <a:endParaRPr lang="zh-CN" altLang="en-US"/>
+          </a:p>
+          <a:p>
+            <a:r>
+              <a:rPr lang="zh-CN" altLang="en-US"/>
+              <a:t>        full will blocks</a:t>
+            </a:r>
+            <a:endParaRPr lang="zh-CN" altLang="en-US"/>
+          </a:p>
+          <a:p>
+            <a:r>
+              <a:rPr lang="zh-CN" altLang="en-US"/>
+              <a:t>    </a:t>
+            </a:r>
+            <a:endParaRPr lang="zh-CN" altLang="en-US"/>
+          </a:p>
+          <a:p>
+            <a:r>
+              <a:rPr lang="zh-CN" altLang="en-US"/>
+              <a:t>    multiplexing with select</a:t>
+            </a:r>
+            <a:endParaRPr lang="zh-CN" altLang="en-US"/>
+          </a:p>
+          <a:p>
+            <a:endParaRPr lang="zh-CN" altLang="en-US"/>
+          </a:p>
+          <a:p>
+            <a:r>
+              <a:rPr lang="zh-CN" altLang="en-US"/>
+              <a:t>        select {</a:t>
+            </a:r>
+            <a:endParaRPr lang="zh-CN" altLang="en-US"/>
+          </a:p>
+          <a:p>
+            <a:r>
+              <a:rPr lang="zh-CN" altLang="en-US"/>
+              <a:t>        case &lt;-ch1:</a:t>
+            </a:r>
+            <a:endParaRPr lang="zh-CN" altLang="en-US"/>
+          </a:p>
+          <a:p>
+            <a:r>
+              <a:rPr lang="zh-CN" altLang="en-US"/>
+              <a:t>            // ...</a:t>
+            </a:r>
+            <a:endParaRPr lang="zh-CN" altLang="en-US"/>
+          </a:p>
+          <a:p>
+            <a:r>
+              <a:rPr lang="zh-CN" altLang="en-US"/>
+              <a:t>        case x := &lt;-ch2:</a:t>
+            </a:r>
+            <a:endParaRPr lang="zh-CN" altLang="en-US"/>
+          </a:p>
+          <a:p>
+            <a:r>
+              <a:rPr lang="zh-CN" altLang="en-US"/>
+              <a:t>            // ...</a:t>
+            </a:r>
+            <a:endParaRPr lang="zh-CN" altLang="en-US"/>
+          </a:p>
+          <a:p>
+            <a:r>
+              <a:rPr lang="zh-CN" altLang="en-US"/>
+              <a:t>        case ch3 &lt;- y:</a:t>
+            </a:r>
+            <a:endParaRPr lang="zh-CN" altLang="en-US"/>
+          </a:p>
+          <a:p>
+            <a:r>
+              <a:rPr lang="zh-CN" altLang="en-US"/>
+              <a:t>            // ...</a:t>
+            </a:r>
+            <a:endParaRPr lang="zh-CN" altLang="en-US"/>
+          </a:p>
+          <a:p>
+            <a:r>
+              <a:rPr lang="zh-CN" altLang="en-US"/>
+              <a:t>        default:</a:t>
+            </a:r>
+            <a:endParaRPr lang="zh-CN" altLang="en-US"/>
+          </a:p>
+          <a:p>
+            <a:r>
+              <a:rPr lang="zh-CN" altLang="en-US"/>
+              <a:t>            // ...</a:t>
+            </a:r>
+            <a:endParaRPr lang="zh-CN" altLang="en-US"/>
+          </a:p>
+          <a:p>
+            <a:r>
+              <a:rPr lang="zh-CN" altLang="en-US"/>
+              <a:t>        }</a:t>
+            </a:r>
+            <a:endParaRPr lang="zh-CN" altLang="en-US"/>
+          </a:p>
+          <a:p>
+            <a:r>
+              <a:rPr lang="zh-CN" altLang="en-US"/>
+              <a:t>    </a:t>
+            </a:r>
+            <a:endParaRPr lang="zh-CN" altLang="en-US"/>
+          </a:p>
+          <a:p>
+            <a:r>
+              <a:rPr lang="zh-CN" altLang="en-US"/>
+              <a:t>    cancellation</a:t>
             </a:r>
             <a:endParaRPr lang="zh-CN" altLang="en-US"/>
           </a:p>

</xml_diff>